<commit_message>
final versions of submissions
</commit_message>
<xml_diff>
--- a/Slide Deck - Movie Recommender.pptx
+++ b/Slide Deck - Movie Recommender.pptx
@@ -6,7 +6,12 @@
   </p:sldMasterIdLst>
   <p:sldIdLst>
     <p:sldId id="256" r:id="rId2"/>
-    <p:sldId id="257" r:id="rId3"/>
+    <p:sldId id="258" r:id="rId3"/>
+    <p:sldId id="259" r:id="rId4"/>
+    <p:sldId id="260" r:id="rId5"/>
+    <p:sldId id="261" r:id="rId6"/>
+    <p:sldId id="263" r:id="rId7"/>
+    <p:sldId id="264" r:id="rId8"/>
   </p:sldIdLst>
   <p:sldSz cx="12192000" cy="6858000"/>
   <p:notesSz cx="6858000" cy="9144000"/>
@@ -105,6 +110,11 @@
       </a:defRPr>
     </a:lvl9pPr>
   </p:defaultTextStyle>
+  <p:extLst>
+    <p:ext uri="{EFAFB233-063F-42B5-8137-9DF3F51BA10A}">
+      <p15:sldGuideLst xmlns:p15="http://schemas.microsoft.com/office/powerpoint/2012/main"/>
+    </p:ext>
+  </p:extLst>
 </p:presentation>
 </file>
 
@@ -257,7 +267,7 @@
           <a:p>
             <a:fld id="{B37ED902-7979-453E-877B-B1A961D0F1D8}" type="datetimeFigureOut">
               <a:rPr lang="en-PH" smtClean="0"/>
-              <a:t>12/6/2024</a:t>
+              <a:t>12/9/2024</a:t>
             </a:fld>
             <a:endParaRPr lang="en-PH"/>
           </a:p>
@@ -457,7 +467,7 @@
           <a:p>
             <a:fld id="{B37ED902-7979-453E-877B-B1A961D0F1D8}" type="datetimeFigureOut">
               <a:rPr lang="en-PH" smtClean="0"/>
-              <a:t>12/6/2024</a:t>
+              <a:t>12/9/2024</a:t>
             </a:fld>
             <a:endParaRPr lang="en-PH"/>
           </a:p>
@@ -667,7 +677,7 @@
           <a:p>
             <a:fld id="{B37ED902-7979-453E-877B-B1A961D0F1D8}" type="datetimeFigureOut">
               <a:rPr lang="en-PH" smtClean="0"/>
-              <a:t>12/6/2024</a:t>
+              <a:t>12/9/2024</a:t>
             </a:fld>
             <a:endParaRPr lang="en-PH"/>
           </a:p>
@@ -867,7 +877,7 @@
           <a:p>
             <a:fld id="{B37ED902-7979-453E-877B-B1A961D0F1D8}" type="datetimeFigureOut">
               <a:rPr lang="en-PH" smtClean="0"/>
-              <a:t>12/6/2024</a:t>
+              <a:t>12/9/2024</a:t>
             </a:fld>
             <a:endParaRPr lang="en-PH"/>
           </a:p>
@@ -1143,7 +1153,7 @@
           <a:p>
             <a:fld id="{B37ED902-7979-453E-877B-B1A961D0F1D8}" type="datetimeFigureOut">
               <a:rPr lang="en-PH" smtClean="0"/>
-              <a:t>12/6/2024</a:t>
+              <a:t>12/9/2024</a:t>
             </a:fld>
             <a:endParaRPr lang="en-PH"/>
           </a:p>
@@ -1411,7 +1421,7 @@
           <a:p>
             <a:fld id="{B37ED902-7979-453E-877B-B1A961D0F1D8}" type="datetimeFigureOut">
               <a:rPr lang="en-PH" smtClean="0"/>
-              <a:t>12/6/2024</a:t>
+              <a:t>12/9/2024</a:t>
             </a:fld>
             <a:endParaRPr lang="en-PH"/>
           </a:p>
@@ -1826,7 +1836,7 @@
           <a:p>
             <a:fld id="{B37ED902-7979-453E-877B-B1A961D0F1D8}" type="datetimeFigureOut">
               <a:rPr lang="en-PH" smtClean="0"/>
-              <a:t>12/6/2024</a:t>
+              <a:t>12/9/2024</a:t>
             </a:fld>
             <a:endParaRPr lang="en-PH"/>
           </a:p>
@@ -1968,7 +1978,7 @@
           <a:p>
             <a:fld id="{B37ED902-7979-453E-877B-B1A961D0F1D8}" type="datetimeFigureOut">
               <a:rPr lang="en-PH" smtClean="0"/>
-              <a:t>12/6/2024</a:t>
+              <a:t>12/9/2024</a:t>
             </a:fld>
             <a:endParaRPr lang="en-PH"/>
           </a:p>
@@ -2081,7 +2091,7 @@
           <a:p>
             <a:fld id="{B37ED902-7979-453E-877B-B1A961D0F1D8}" type="datetimeFigureOut">
               <a:rPr lang="en-PH" smtClean="0"/>
-              <a:t>12/6/2024</a:t>
+              <a:t>12/9/2024</a:t>
             </a:fld>
             <a:endParaRPr lang="en-PH"/>
           </a:p>
@@ -2394,7 +2404,7 @@
           <a:p>
             <a:fld id="{B37ED902-7979-453E-877B-B1A961D0F1D8}" type="datetimeFigureOut">
               <a:rPr lang="en-PH" smtClean="0"/>
-              <a:t>12/6/2024</a:t>
+              <a:t>12/9/2024</a:t>
             </a:fld>
             <a:endParaRPr lang="en-PH"/>
           </a:p>
@@ -2683,7 +2693,7 @@
           <a:p>
             <a:fld id="{B37ED902-7979-453E-877B-B1A961D0F1D8}" type="datetimeFigureOut">
               <a:rPr lang="en-PH" smtClean="0"/>
-              <a:t>12/6/2024</a:t>
+              <a:t>12/9/2024</a:t>
             </a:fld>
             <a:endParaRPr lang="en-PH"/>
           </a:p>
@@ -2926,7 +2936,7 @@
           <a:p>
             <a:fld id="{B37ED902-7979-453E-877B-B1A961D0F1D8}" type="datetimeFigureOut">
               <a:rPr lang="en-PH" smtClean="0"/>
-              <a:t>12/6/2024</a:t>
+              <a:t>12/9/2024</a:t>
             </a:fld>
             <a:endParaRPr lang="en-PH"/>
           </a:p>
@@ -3436,7 +3446,7 @@
           <p:cNvPr id="2" name="Title 1">
             <a:extLst>
               <a:ext uri="{FF2B5EF4-FFF2-40B4-BE49-F238E27FC236}">
-                <a16:creationId xmlns:a16="http://schemas.microsoft.com/office/drawing/2014/main" id="{58CE609C-85BC-C0FD-7A95-91D4BDBB8933}"/>
+                <a16:creationId xmlns:a16="http://schemas.microsoft.com/office/drawing/2014/main" id="{98606BFE-4010-8287-9914-04CE021D11A8}"/>
               </a:ext>
             </a:extLst>
           </p:cNvPr>
@@ -3452,7 +3462,11 @@
           <a:bodyPr/>
           <a:lstStyle/>
           <a:p>
-            <a:endParaRPr lang="en-PH"/>
+            <a:r>
+              <a:rPr lang="en-GB" dirty="0"/>
+              <a:t>Dataset Preparation</a:t>
+            </a:r>
+            <a:endParaRPr lang="en-PH" dirty="0"/>
           </a:p>
         </p:txBody>
       </p:sp>
@@ -3461,7 +3475,7 @@
           <p:cNvPr id="3" name="Content Placeholder 2">
             <a:extLst>
               <a:ext uri="{FF2B5EF4-FFF2-40B4-BE49-F238E27FC236}">
-                <a16:creationId xmlns:a16="http://schemas.microsoft.com/office/drawing/2014/main" id="{C42B3786-3D1C-0A5D-A32D-564F26AC92A3}"/>
+                <a16:creationId xmlns:a16="http://schemas.microsoft.com/office/drawing/2014/main" id="{3D3F9D11-70D4-17EC-91A5-6F9D1BDBF91C}"/>
               </a:ext>
             </a:extLst>
           </p:cNvPr>
@@ -3479,15 +3493,55 @@
           <a:p>
             <a:r>
               <a:rPr lang="en-GB" dirty="0"/>
-              <a:t>I am still currently working on the slides, but I will update this </a:t>
+              <a:t>We used the </a:t>
             </a:r>
             <a:r>
               <a:rPr lang="en-GB" dirty="0" err="1"/>
-              <a:t>Github</a:t>
+              <a:t>MovieLens</a:t>
             </a:r>
             <a:r>
               <a:rPr lang="en-GB" dirty="0"/>
-              <a:t> repo ASAP. I ask for your kind understanding with my tardy output. I was sick since yesterday, so it was difficult to work.</a:t>
+              <a:t> 20M dataset</a:t>
+            </a:r>
+          </a:p>
+          <a:p>
+            <a:r>
+              <a:rPr lang="en-GB" dirty="0"/>
+              <a:t>Due to memory constraints, we filtered for:</a:t>
+            </a:r>
+          </a:p>
+          <a:p>
+            <a:pPr lvl="1"/>
+            <a:r>
+              <a:rPr lang="en-GB" dirty="0"/>
+              <a:t>Only movies</a:t>
+            </a:r>
+          </a:p>
+          <a:p>
+            <a:pPr lvl="1"/>
+            <a:r>
+              <a:rPr lang="en-GB" dirty="0"/>
+              <a:t>Only titles released 2000 onwards</a:t>
+            </a:r>
+          </a:p>
+          <a:p>
+            <a:r>
+              <a:rPr lang="en-GB" dirty="0"/>
+              <a:t>The resulting user-item interaction matrix has:</a:t>
+            </a:r>
+          </a:p>
+          <a:p>
+            <a:pPr lvl="1"/>
+            <a:r>
+              <a:rPr lang="en-GB" dirty="0"/>
+              <a:t>9,894 movies</a:t>
+            </a:r>
+          </a:p>
+          <a:p>
+            <a:pPr lvl="1"/>
+            <a:r>
+              <a:rPr lang="en-GB" dirty="0"/>
+              <a:t>77,805 users</a:t>
             </a:r>
             <a:endParaRPr lang="en-PH" dirty="0"/>
           </a:p>
@@ -3496,7 +3550,772 @@
     </p:spTree>
     <p:extLst>
       <p:ext uri="{BB962C8B-B14F-4D97-AF65-F5344CB8AC3E}">
-        <p14:creationId xmlns:p14="http://schemas.microsoft.com/office/powerpoint/2010/main" val="2933633306"/>
+        <p14:creationId xmlns:p14="http://schemas.microsoft.com/office/powerpoint/2010/main" val="1545770131"/>
+      </p:ext>
+    </p:extLst>
+  </p:cSld>
+  <p:clrMapOvr>
+    <a:masterClrMapping/>
+  </p:clrMapOvr>
+</p:sld>
+</file>
+
+<file path=ppt/slides/slide3.xml><?xml version="1.0" encoding="utf-8"?>
+<p:sld xmlns:a="http://schemas.openxmlformats.org/drawingml/2006/main" xmlns:r="http://schemas.openxmlformats.org/officeDocument/2006/relationships" xmlns:p="http://schemas.openxmlformats.org/presentationml/2006/main">
+  <p:cSld>
+    <p:spTree>
+      <p:nvGrpSpPr>
+        <p:cNvPr id="1" name=""/>
+        <p:cNvGrpSpPr/>
+        <p:nvPr/>
+      </p:nvGrpSpPr>
+      <p:grpSpPr>
+        <a:xfrm>
+          <a:off x="0" y="0"/>
+          <a:ext cx="0" cy="0"/>
+          <a:chOff x="0" y="0"/>
+          <a:chExt cx="0" cy="0"/>
+        </a:xfrm>
+      </p:grpSpPr>
+      <p:sp>
+        <p:nvSpPr>
+          <p:cNvPr id="2" name="Title 1">
+            <a:extLst>
+              <a:ext uri="{FF2B5EF4-FFF2-40B4-BE49-F238E27FC236}">
+                <a16:creationId xmlns:a16="http://schemas.microsoft.com/office/drawing/2014/main" id="{B35D7B25-1695-7E0F-06D5-D377D1527D6C}"/>
+              </a:ext>
+            </a:extLst>
+          </p:cNvPr>
+          <p:cNvSpPr>
+            <a:spLocks noGrp="1"/>
+          </p:cNvSpPr>
+          <p:nvPr>
+            <p:ph type="title"/>
+          </p:nvPr>
+        </p:nvSpPr>
+        <p:spPr/>
+        <p:txBody>
+          <a:bodyPr/>
+          <a:lstStyle/>
+          <a:p>
+            <a:r>
+              <a:rPr lang="en-GB" dirty="0"/>
+              <a:t>Baseline model</a:t>
+            </a:r>
+            <a:endParaRPr lang="en-PH" dirty="0"/>
+          </a:p>
+        </p:txBody>
+      </p:sp>
+      <p:sp>
+        <p:nvSpPr>
+          <p:cNvPr id="3" name="Content Placeholder 2">
+            <a:extLst>
+              <a:ext uri="{FF2B5EF4-FFF2-40B4-BE49-F238E27FC236}">
+                <a16:creationId xmlns:a16="http://schemas.microsoft.com/office/drawing/2014/main" id="{E7D0AC5C-38DC-09D7-BD57-CCAFA768AA0C}"/>
+              </a:ext>
+            </a:extLst>
+          </p:cNvPr>
+          <p:cNvSpPr>
+            <a:spLocks noGrp="1"/>
+          </p:cNvSpPr>
+          <p:nvPr>
+            <p:ph idx="1"/>
+          </p:nvPr>
+        </p:nvSpPr>
+        <p:spPr>
+          <a:xfrm>
+            <a:off x="838200" y="1583635"/>
+            <a:ext cx="10515600" cy="4593328"/>
+          </a:xfrm>
+        </p:spPr>
+        <p:txBody>
+          <a:bodyPr/>
+          <a:lstStyle/>
+          <a:p>
+            <a:r>
+              <a:rPr lang="en-GB" dirty="0"/>
+              <a:t>We used K-nearest </a:t>
+            </a:r>
+            <a:r>
+              <a:rPr lang="en-GB" dirty="0" err="1"/>
+              <a:t>neighbors</a:t>
+            </a:r>
+            <a:r>
+              <a:rPr lang="en-GB" dirty="0"/>
+              <a:t> for the baseline</a:t>
+            </a:r>
+          </a:p>
+          <a:p>
+            <a:r>
+              <a:rPr lang="en-GB" dirty="0"/>
+              <a:t>We wrote a function that recommends movies given a set of movies that a new user likes (this user is not in the dataset)</a:t>
+            </a:r>
+          </a:p>
+          <a:p>
+            <a:pPr marL="0" indent="0">
+              <a:buNone/>
+            </a:pPr>
+            <a:endParaRPr lang="en-PH" dirty="0"/>
+          </a:p>
+        </p:txBody>
+      </p:sp>
+      <p:pic>
+        <p:nvPicPr>
+          <p:cNvPr id="7" name="Picture 6">
+            <a:extLst>
+              <a:ext uri="{FF2B5EF4-FFF2-40B4-BE49-F238E27FC236}">
+                <a16:creationId xmlns:a16="http://schemas.microsoft.com/office/drawing/2014/main" id="{2E0E2C37-868D-6AB9-FD68-D722BBEF79E0}"/>
+              </a:ext>
+            </a:extLst>
+          </p:cNvPr>
+          <p:cNvPicPr>
+            <a:picLocks noChangeAspect="1"/>
+          </p:cNvPicPr>
+          <p:nvPr/>
+        </p:nvPicPr>
+        <p:blipFill>
+          <a:blip r:embed="rId2"/>
+          <a:stretch>
+            <a:fillRect/>
+          </a:stretch>
+        </p:blipFill>
+        <p:spPr>
+          <a:xfrm>
+            <a:off x="1792929" y="2959251"/>
+            <a:ext cx="7944959" cy="3429479"/>
+          </a:xfrm>
+          <a:prstGeom prst="rect">
+            <a:avLst/>
+          </a:prstGeom>
+        </p:spPr>
+      </p:pic>
+    </p:spTree>
+    <p:extLst>
+      <p:ext uri="{BB962C8B-B14F-4D97-AF65-F5344CB8AC3E}">
+        <p14:creationId xmlns:p14="http://schemas.microsoft.com/office/powerpoint/2010/main" val="1727527784"/>
+      </p:ext>
+    </p:extLst>
+  </p:cSld>
+  <p:clrMapOvr>
+    <a:masterClrMapping/>
+  </p:clrMapOvr>
+</p:sld>
+</file>
+
+<file path=ppt/slides/slide4.xml><?xml version="1.0" encoding="utf-8"?>
+<p:sld xmlns:a="http://schemas.openxmlformats.org/drawingml/2006/main" xmlns:r="http://schemas.openxmlformats.org/officeDocument/2006/relationships" xmlns:p="http://schemas.openxmlformats.org/presentationml/2006/main">
+  <p:cSld>
+    <p:spTree>
+      <p:nvGrpSpPr>
+        <p:cNvPr id="1" name=""/>
+        <p:cNvGrpSpPr/>
+        <p:nvPr/>
+      </p:nvGrpSpPr>
+      <p:grpSpPr>
+        <a:xfrm>
+          <a:off x="0" y="0"/>
+          <a:ext cx="0" cy="0"/>
+          <a:chOff x="0" y="0"/>
+          <a:chExt cx="0" cy="0"/>
+        </a:xfrm>
+      </p:grpSpPr>
+      <p:sp>
+        <p:nvSpPr>
+          <p:cNvPr id="2" name="Title 1">
+            <a:extLst>
+              <a:ext uri="{FF2B5EF4-FFF2-40B4-BE49-F238E27FC236}">
+                <a16:creationId xmlns:a16="http://schemas.microsoft.com/office/drawing/2014/main" id="{65C7A8DD-31D3-FB66-973E-45EF6782CF6C}"/>
+              </a:ext>
+            </a:extLst>
+          </p:cNvPr>
+          <p:cNvSpPr>
+            <a:spLocks noGrp="1"/>
+          </p:cNvSpPr>
+          <p:nvPr>
+            <p:ph type="title"/>
+          </p:nvPr>
+        </p:nvSpPr>
+        <p:spPr/>
+        <p:txBody>
+          <a:bodyPr/>
+          <a:lstStyle/>
+          <a:p>
+            <a:r>
+              <a:rPr lang="en-GB" dirty="0"/>
+              <a:t>Non-negative Matrix Factorization</a:t>
+            </a:r>
+            <a:endParaRPr lang="en-PH" dirty="0"/>
+          </a:p>
+        </p:txBody>
+      </p:sp>
+      <p:sp>
+        <p:nvSpPr>
+          <p:cNvPr id="3" name="Content Placeholder 2">
+            <a:extLst>
+              <a:ext uri="{FF2B5EF4-FFF2-40B4-BE49-F238E27FC236}">
+                <a16:creationId xmlns:a16="http://schemas.microsoft.com/office/drawing/2014/main" id="{970F6877-FC40-03D1-0EFA-0B1A99DA3928}"/>
+              </a:ext>
+            </a:extLst>
+          </p:cNvPr>
+          <p:cNvSpPr>
+            <a:spLocks noGrp="1"/>
+          </p:cNvSpPr>
+          <p:nvPr>
+            <p:ph idx="1"/>
+          </p:nvPr>
+        </p:nvSpPr>
+        <p:spPr>
+          <a:xfrm>
+            <a:off x="838200" y="1519311"/>
+            <a:ext cx="10515600" cy="4657652"/>
+          </a:xfrm>
+        </p:spPr>
+        <p:txBody>
+          <a:bodyPr/>
+          <a:lstStyle/>
+          <a:p>
+            <a:r>
+              <a:rPr lang="en-GB" dirty="0"/>
+              <a:t>We used the </a:t>
+            </a:r>
+            <a:r>
+              <a:rPr lang="en-GB" dirty="0" err="1"/>
+              <a:t>sklearn</a:t>
+            </a:r>
+            <a:r>
+              <a:rPr lang="en-GB" dirty="0"/>
+              <a:t> implementation of NMF model for building a recommender</a:t>
+            </a:r>
+          </a:p>
+          <a:p>
+            <a:pPr lvl="1"/>
+            <a:r>
+              <a:rPr lang="en-GB" dirty="0"/>
+              <a:t>Number of latent factors = 50</a:t>
+            </a:r>
+          </a:p>
+          <a:p>
+            <a:pPr lvl="1"/>
+            <a:r>
+              <a:rPr lang="en-GB" dirty="0"/>
+              <a:t>Matrix initialization – random</a:t>
+            </a:r>
+          </a:p>
+          <a:p>
+            <a:pPr lvl="1"/>
+            <a:endParaRPr lang="en-GB" dirty="0"/>
+          </a:p>
+          <a:p>
+            <a:r>
+              <a:rPr lang="en-GB" dirty="0" err="1"/>
+              <a:t>Sklearn</a:t>
+            </a:r>
+            <a:r>
+              <a:rPr lang="en-GB" dirty="0"/>
+              <a:t> references:</a:t>
+            </a:r>
+          </a:p>
+          <a:p>
+            <a:pPr lvl="1"/>
+            <a:r>
+              <a:rPr lang="en-PH" b="0" i="0" dirty="0">
+                <a:effectLst/>
+                <a:latin typeface="-apple-system"/>
+                <a:hlinkClick r:id="rId2"/>
+              </a:rPr>
+              <a:t>“Fast local algorithms for large scale nonnegative matrix and tensor factorizations”</a:t>
+            </a:r>
+            <a:r>
+              <a:rPr lang="en-PH" b="0" i="0" dirty="0">
+                <a:solidFill>
+                  <a:srgbClr val="222832"/>
+                </a:solidFill>
+                <a:effectLst/>
+                <a:latin typeface="-apple-system"/>
+              </a:rPr>
+              <a:t> Cichocki, Andrzej, and P. H. A. N. Anh-Huy. IEICE transactions on fundamentals of electronics, communications and computer sciences 92.3: 708-721, 2009.</a:t>
+            </a:r>
+          </a:p>
+          <a:p>
+            <a:pPr lvl="1"/>
+            <a:r>
+              <a:rPr lang="en-PH" b="0" i="0" dirty="0">
+                <a:effectLst/>
+                <a:latin typeface="-apple-system"/>
+                <a:hlinkClick r:id="rId3"/>
+              </a:rPr>
+              <a:t>“Algorithms for nonnegative matrix factorization with the beta-divergence”</a:t>
+            </a:r>
+            <a:r>
+              <a:rPr lang="en-PH" b="0" i="0" dirty="0">
+                <a:solidFill>
+                  <a:srgbClr val="222832"/>
+                </a:solidFill>
+                <a:effectLst/>
+                <a:latin typeface="-apple-system"/>
+              </a:rPr>
+              <a:t> </a:t>
+            </a:r>
+            <a:r>
+              <a:rPr lang="en-PH" b="0" i="0" dirty="0" err="1">
+                <a:solidFill>
+                  <a:srgbClr val="222832"/>
+                </a:solidFill>
+                <a:effectLst/>
+                <a:latin typeface="-apple-system"/>
+              </a:rPr>
+              <a:t>Fevotte</a:t>
+            </a:r>
+            <a:r>
+              <a:rPr lang="en-PH" b="0" i="0" dirty="0">
+                <a:solidFill>
+                  <a:srgbClr val="222832"/>
+                </a:solidFill>
+                <a:effectLst/>
+                <a:latin typeface="-apple-system"/>
+              </a:rPr>
+              <a:t>, C., &amp; </a:t>
+            </a:r>
+            <a:r>
+              <a:rPr lang="en-PH" b="0" i="0" dirty="0" err="1">
+                <a:solidFill>
+                  <a:srgbClr val="222832"/>
+                </a:solidFill>
+                <a:effectLst/>
+                <a:latin typeface="-apple-system"/>
+              </a:rPr>
+              <a:t>Idier</a:t>
+            </a:r>
+            <a:r>
+              <a:rPr lang="en-PH" b="0" i="0" dirty="0">
+                <a:solidFill>
+                  <a:srgbClr val="222832"/>
+                </a:solidFill>
+                <a:effectLst/>
+                <a:latin typeface="-apple-system"/>
+              </a:rPr>
+              <a:t>, J. (2011). Neural Computation, 23(9).</a:t>
+            </a:r>
+            <a:endParaRPr lang="en-PH" dirty="0"/>
+          </a:p>
+        </p:txBody>
+      </p:sp>
+    </p:spTree>
+    <p:extLst>
+      <p:ext uri="{BB962C8B-B14F-4D97-AF65-F5344CB8AC3E}">
+        <p14:creationId xmlns:p14="http://schemas.microsoft.com/office/powerpoint/2010/main" val="1443590405"/>
+      </p:ext>
+    </p:extLst>
+  </p:cSld>
+  <p:clrMapOvr>
+    <a:masterClrMapping/>
+  </p:clrMapOvr>
+</p:sld>
+</file>
+
+<file path=ppt/slides/slide5.xml><?xml version="1.0" encoding="utf-8"?>
+<p:sld xmlns:a="http://schemas.openxmlformats.org/drawingml/2006/main" xmlns:r="http://schemas.openxmlformats.org/officeDocument/2006/relationships" xmlns:p="http://schemas.openxmlformats.org/presentationml/2006/main">
+  <p:cSld>
+    <p:spTree>
+      <p:nvGrpSpPr>
+        <p:cNvPr id="1" name=""/>
+        <p:cNvGrpSpPr/>
+        <p:nvPr/>
+      </p:nvGrpSpPr>
+      <p:grpSpPr>
+        <a:xfrm>
+          <a:off x="0" y="0"/>
+          <a:ext cx="0" cy="0"/>
+          <a:chOff x="0" y="0"/>
+          <a:chExt cx="0" cy="0"/>
+        </a:xfrm>
+      </p:grpSpPr>
+      <p:sp>
+        <p:nvSpPr>
+          <p:cNvPr id="2" name="Title 1">
+            <a:extLst>
+              <a:ext uri="{FF2B5EF4-FFF2-40B4-BE49-F238E27FC236}">
+                <a16:creationId xmlns:a16="http://schemas.microsoft.com/office/drawing/2014/main" id="{6E57037D-2BF8-EC01-39DF-7D00C46D18A2}"/>
+              </a:ext>
+            </a:extLst>
+          </p:cNvPr>
+          <p:cNvSpPr>
+            <a:spLocks noGrp="1"/>
+          </p:cNvSpPr>
+          <p:nvPr>
+            <p:ph type="title"/>
+          </p:nvPr>
+        </p:nvSpPr>
+        <p:spPr>
+          <a:xfrm>
+            <a:off x="838200" y="365125"/>
+            <a:ext cx="10515600" cy="830629"/>
+          </a:xfrm>
+        </p:spPr>
+        <p:txBody>
+          <a:bodyPr/>
+          <a:lstStyle/>
+          <a:p>
+            <a:r>
+              <a:rPr lang="en-GB" dirty="0"/>
+              <a:t>Evaluation metric</a:t>
+            </a:r>
+            <a:endParaRPr lang="en-PH" dirty="0"/>
+          </a:p>
+        </p:txBody>
+      </p:sp>
+      <p:sp>
+        <p:nvSpPr>
+          <p:cNvPr id="3" name="Content Placeholder 2">
+            <a:extLst>
+              <a:ext uri="{FF2B5EF4-FFF2-40B4-BE49-F238E27FC236}">
+                <a16:creationId xmlns:a16="http://schemas.microsoft.com/office/drawing/2014/main" id="{148882CB-C63A-15E7-17DF-16CF1AD0D0CF}"/>
+              </a:ext>
+            </a:extLst>
+          </p:cNvPr>
+          <p:cNvSpPr>
+            <a:spLocks noGrp="1"/>
+          </p:cNvSpPr>
+          <p:nvPr>
+            <p:ph idx="1"/>
+          </p:nvPr>
+        </p:nvSpPr>
+        <p:spPr>
+          <a:xfrm>
+            <a:off x="838200" y="1336432"/>
+            <a:ext cx="10515600" cy="4840532"/>
+          </a:xfrm>
+        </p:spPr>
+        <p:txBody>
+          <a:bodyPr/>
+          <a:lstStyle/>
+          <a:p>
+            <a:r>
+              <a:rPr lang="en-GB" dirty="0"/>
+              <a:t>We chose the </a:t>
+            </a:r>
+            <a:r>
+              <a:rPr lang="en-GB" b="1" dirty="0"/>
+              <a:t>Normalized Discounted Cumulative Gain (NDCG) </a:t>
+            </a:r>
+            <a:r>
+              <a:rPr lang="en-GB" dirty="0"/>
+              <a:t>metric for evaluating the performance of the recommenders</a:t>
+            </a:r>
+          </a:p>
+          <a:p>
+            <a:r>
+              <a:rPr lang="en-GB" dirty="0"/>
+              <a:t>It encapsulates how well the ranked recommendations correspond to the theoretical desired items</a:t>
+            </a:r>
+          </a:p>
+          <a:p>
+            <a:r>
+              <a:rPr lang="en-GB" dirty="0"/>
+              <a:t>For a streaming service, you want to recommend the closest items first!</a:t>
+            </a:r>
+            <a:endParaRPr lang="en-PH" dirty="0"/>
+          </a:p>
+        </p:txBody>
+      </p:sp>
+      <p:pic>
+        <p:nvPicPr>
+          <p:cNvPr id="5" name="Picture 4">
+            <a:extLst>
+              <a:ext uri="{FF2B5EF4-FFF2-40B4-BE49-F238E27FC236}">
+                <a16:creationId xmlns:a16="http://schemas.microsoft.com/office/drawing/2014/main" id="{4341B28C-8025-46C6-DBEF-0B9DD353AA5D}"/>
+              </a:ext>
+            </a:extLst>
+          </p:cNvPr>
+          <p:cNvPicPr>
+            <a:picLocks noChangeAspect="1"/>
+          </p:cNvPicPr>
+          <p:nvPr/>
+        </p:nvPicPr>
+        <p:blipFill>
+          <a:blip r:embed="rId2"/>
+          <a:stretch>
+            <a:fillRect/>
+          </a:stretch>
+        </p:blipFill>
+        <p:spPr>
+          <a:xfrm>
+            <a:off x="990514" y="4239655"/>
+            <a:ext cx="2276793" cy="981212"/>
+          </a:xfrm>
+          <a:prstGeom prst="rect">
+            <a:avLst/>
+          </a:prstGeom>
+        </p:spPr>
+      </p:pic>
+      <p:pic>
+        <p:nvPicPr>
+          <p:cNvPr id="7" name="Picture 6">
+            <a:extLst>
+              <a:ext uri="{FF2B5EF4-FFF2-40B4-BE49-F238E27FC236}">
+                <a16:creationId xmlns:a16="http://schemas.microsoft.com/office/drawing/2014/main" id="{E6C88714-C38F-6FF9-BAC9-5C20C36661FE}"/>
+              </a:ext>
+            </a:extLst>
+          </p:cNvPr>
+          <p:cNvPicPr>
+            <a:picLocks noChangeAspect="1"/>
+          </p:cNvPicPr>
+          <p:nvPr/>
+        </p:nvPicPr>
+        <p:blipFill>
+          <a:blip r:embed="rId3"/>
+          <a:stretch>
+            <a:fillRect/>
+          </a:stretch>
+        </p:blipFill>
+        <p:spPr>
+          <a:xfrm>
+            <a:off x="3696928" y="4239655"/>
+            <a:ext cx="3391373" cy="1181265"/>
+          </a:xfrm>
+          <a:prstGeom prst="rect">
+            <a:avLst/>
+          </a:prstGeom>
+        </p:spPr>
+      </p:pic>
+      <p:pic>
+        <p:nvPicPr>
+          <p:cNvPr id="9" name="Picture 8">
+            <a:extLst>
+              <a:ext uri="{FF2B5EF4-FFF2-40B4-BE49-F238E27FC236}">
+                <a16:creationId xmlns:a16="http://schemas.microsoft.com/office/drawing/2014/main" id="{43EE6370-4BA5-10F9-AD14-4BDA436FB596}"/>
+              </a:ext>
+            </a:extLst>
+          </p:cNvPr>
+          <p:cNvPicPr>
+            <a:picLocks noChangeAspect="1"/>
+          </p:cNvPicPr>
+          <p:nvPr/>
+        </p:nvPicPr>
+        <p:blipFill>
+          <a:blip r:embed="rId4"/>
+          <a:stretch>
+            <a:fillRect/>
+          </a:stretch>
+        </p:blipFill>
+        <p:spPr>
+          <a:xfrm>
+            <a:off x="7357614" y="4282523"/>
+            <a:ext cx="3134162" cy="1095528"/>
+          </a:xfrm>
+          <a:prstGeom prst="rect">
+            <a:avLst/>
+          </a:prstGeom>
+        </p:spPr>
+      </p:pic>
+    </p:spTree>
+    <p:extLst>
+      <p:ext uri="{BB962C8B-B14F-4D97-AF65-F5344CB8AC3E}">
+        <p14:creationId xmlns:p14="http://schemas.microsoft.com/office/powerpoint/2010/main" val="1937518130"/>
+      </p:ext>
+    </p:extLst>
+  </p:cSld>
+  <p:clrMapOvr>
+    <a:masterClrMapping/>
+  </p:clrMapOvr>
+</p:sld>
+</file>
+
+<file path=ppt/slides/slide6.xml><?xml version="1.0" encoding="utf-8"?>
+<p:sld xmlns:a="http://schemas.openxmlformats.org/drawingml/2006/main" xmlns:r="http://schemas.openxmlformats.org/officeDocument/2006/relationships" xmlns:p="http://schemas.openxmlformats.org/presentationml/2006/main">
+  <p:cSld>
+    <p:spTree>
+      <p:nvGrpSpPr>
+        <p:cNvPr id="1" name=""/>
+        <p:cNvGrpSpPr/>
+        <p:nvPr/>
+      </p:nvGrpSpPr>
+      <p:grpSpPr>
+        <a:xfrm>
+          <a:off x="0" y="0"/>
+          <a:ext cx="0" cy="0"/>
+          <a:chOff x="0" y="0"/>
+          <a:chExt cx="0" cy="0"/>
+        </a:xfrm>
+      </p:grpSpPr>
+      <p:sp>
+        <p:nvSpPr>
+          <p:cNvPr id="2" name="Title 1">
+            <a:extLst>
+              <a:ext uri="{FF2B5EF4-FFF2-40B4-BE49-F238E27FC236}">
+                <a16:creationId xmlns:a16="http://schemas.microsoft.com/office/drawing/2014/main" id="{4E3C3F12-065B-37BE-8BE3-E73F61DFA3CA}"/>
+              </a:ext>
+            </a:extLst>
+          </p:cNvPr>
+          <p:cNvSpPr>
+            <a:spLocks noGrp="1"/>
+          </p:cNvSpPr>
+          <p:nvPr>
+            <p:ph type="title"/>
+          </p:nvPr>
+        </p:nvSpPr>
+        <p:spPr/>
+        <p:txBody>
+          <a:bodyPr/>
+          <a:lstStyle/>
+          <a:p>
+            <a:r>
+              <a:rPr lang="en-GB" dirty="0"/>
+              <a:t>Model performance</a:t>
+            </a:r>
+            <a:endParaRPr lang="en-PH" dirty="0"/>
+          </a:p>
+        </p:txBody>
+      </p:sp>
+      <p:sp>
+        <p:nvSpPr>
+          <p:cNvPr id="3" name="Content Placeholder 2">
+            <a:extLst>
+              <a:ext uri="{FF2B5EF4-FFF2-40B4-BE49-F238E27FC236}">
+                <a16:creationId xmlns:a16="http://schemas.microsoft.com/office/drawing/2014/main" id="{D5EEFE2F-98D4-9378-01D3-30FFA7BB6ED9}"/>
+              </a:ext>
+            </a:extLst>
+          </p:cNvPr>
+          <p:cNvSpPr>
+            <a:spLocks noGrp="1"/>
+          </p:cNvSpPr>
+          <p:nvPr>
+            <p:ph idx="1"/>
+          </p:nvPr>
+        </p:nvSpPr>
+        <p:spPr/>
+        <p:txBody>
+          <a:bodyPr/>
+          <a:lstStyle/>
+          <a:p>
+            <a:r>
+              <a:rPr lang="en-GB" dirty="0"/>
+              <a:t>KNN recommender</a:t>
+            </a:r>
+          </a:p>
+          <a:p>
+            <a:pPr lvl="1"/>
+            <a:r>
+              <a:rPr lang="en-GB" dirty="0"/>
+              <a:t>NDCG@5 = 0.3997</a:t>
+            </a:r>
+          </a:p>
+          <a:p>
+            <a:r>
+              <a:rPr lang="en-GB" dirty="0"/>
+              <a:t>NMF recommender</a:t>
+            </a:r>
+          </a:p>
+          <a:p>
+            <a:pPr lvl="1"/>
+            <a:r>
+              <a:rPr lang="en-GB" dirty="0"/>
+              <a:t>NDCG@5 = 0.822</a:t>
+            </a:r>
+          </a:p>
+          <a:p>
+            <a:r>
+              <a:rPr lang="en-GB" dirty="0"/>
+              <a:t>A perfect ranking score is 1.</a:t>
+            </a:r>
+          </a:p>
+          <a:p>
+            <a:r>
+              <a:rPr lang="en-GB" dirty="0"/>
+              <a:t>The NMF model performed better!</a:t>
+            </a:r>
+            <a:endParaRPr lang="en-PH" dirty="0"/>
+          </a:p>
+        </p:txBody>
+      </p:sp>
+    </p:spTree>
+    <p:extLst>
+      <p:ext uri="{BB962C8B-B14F-4D97-AF65-F5344CB8AC3E}">
+        <p14:creationId xmlns:p14="http://schemas.microsoft.com/office/powerpoint/2010/main" val="2824767786"/>
+      </p:ext>
+    </p:extLst>
+  </p:cSld>
+  <p:clrMapOvr>
+    <a:masterClrMapping/>
+  </p:clrMapOvr>
+</p:sld>
+</file>
+
+<file path=ppt/slides/slide7.xml><?xml version="1.0" encoding="utf-8"?>
+<p:sld xmlns:a="http://schemas.openxmlformats.org/drawingml/2006/main" xmlns:r="http://schemas.openxmlformats.org/officeDocument/2006/relationships" xmlns:p="http://schemas.openxmlformats.org/presentationml/2006/main">
+  <p:cSld>
+    <p:spTree>
+      <p:nvGrpSpPr>
+        <p:cNvPr id="1" name=""/>
+        <p:cNvGrpSpPr/>
+        <p:nvPr/>
+      </p:nvGrpSpPr>
+      <p:grpSpPr>
+        <a:xfrm>
+          <a:off x="0" y="0"/>
+          <a:ext cx="0" cy="0"/>
+          <a:chOff x="0" y="0"/>
+          <a:chExt cx="0" cy="0"/>
+        </a:xfrm>
+      </p:grpSpPr>
+      <p:sp>
+        <p:nvSpPr>
+          <p:cNvPr id="2" name="Title 1">
+            <a:extLst>
+              <a:ext uri="{FF2B5EF4-FFF2-40B4-BE49-F238E27FC236}">
+                <a16:creationId xmlns:a16="http://schemas.microsoft.com/office/drawing/2014/main" id="{55E52A17-B34C-A0CA-23EA-C3F82D12B60F}"/>
+              </a:ext>
+            </a:extLst>
+          </p:cNvPr>
+          <p:cNvSpPr>
+            <a:spLocks noGrp="1"/>
+          </p:cNvSpPr>
+          <p:nvPr>
+            <p:ph type="ctrTitle"/>
+          </p:nvPr>
+        </p:nvSpPr>
+        <p:spPr/>
+        <p:txBody>
+          <a:bodyPr/>
+          <a:lstStyle/>
+          <a:p>
+            <a:r>
+              <a:rPr lang="en-GB" dirty="0"/>
+              <a:t>Thank you!</a:t>
+            </a:r>
+            <a:endParaRPr lang="en-PH" dirty="0"/>
+          </a:p>
+        </p:txBody>
+      </p:sp>
+      <p:sp>
+        <p:nvSpPr>
+          <p:cNvPr id="3" name="Subtitle 2">
+            <a:extLst>
+              <a:ext uri="{FF2B5EF4-FFF2-40B4-BE49-F238E27FC236}">
+                <a16:creationId xmlns:a16="http://schemas.microsoft.com/office/drawing/2014/main" id="{AE3F156E-7AF8-7C62-2462-67DB8AC825E6}"/>
+              </a:ext>
+            </a:extLst>
+          </p:cNvPr>
+          <p:cNvSpPr>
+            <a:spLocks noGrp="1"/>
+          </p:cNvSpPr>
+          <p:nvPr>
+            <p:ph type="subTitle" idx="1"/>
+          </p:nvPr>
+        </p:nvSpPr>
+        <p:spPr/>
+        <p:txBody>
+          <a:bodyPr/>
+          <a:lstStyle/>
+          <a:p>
+            <a:endParaRPr lang="en-PH"/>
+          </a:p>
+        </p:txBody>
+      </p:sp>
+    </p:spTree>
+    <p:extLst>
+      <p:ext uri="{BB962C8B-B14F-4D97-AF65-F5344CB8AC3E}">
+        <p14:creationId xmlns:p14="http://schemas.microsoft.com/office/powerpoint/2010/main" val="428591563"/>
       </p:ext>
     </p:extLst>
   </p:cSld>

</xml_diff>